<commit_message>
subquery corrected by Ian 20160428
</commit_message>
<xml_diff>
--- a/sys_ChickMassStats.pptx
+++ b/sys_ChickMassStats.pptx
@@ -111,19 +111,6 @@
 <p:cmAuthorLst xmlns:a="http://schemas.openxmlformats.org/drawingml/2006/main" xmlns:r="http://schemas.openxmlformats.org/officeDocument/2006/relationships" xmlns:p="http://schemas.openxmlformats.org/presentationml/2006/main">
   <p:cmAuthor id="0" name="Malika" initials="MI" lastIdx="6" clrIdx="0"/>
 </p:cmAuthorLst>
-</file>
-
-<file path=ppt/comments/comment1.xml><?xml version="1.0" encoding="utf-8"?>
-<p:cmLst xmlns:a="http://schemas.openxmlformats.org/drawingml/2006/main" xmlns:r="http://schemas.openxmlformats.org/officeDocument/2006/relationships" xmlns:p="http://schemas.openxmlformats.org/presentationml/2006/main">
-  <p:cm authorId="0" dt="2015-11-26T17:14:44.751" idx="5">
-    <p:pos x="4706" y="1149"/>
-    <p:text>see sys_LastSeenAlive for potential issues with this query</p:text>
-  </p:cm>
-  <p:cm authorId="0" dt="2015-11-26T17:14:53.647" idx="6">
-    <p:pos x="1325" y="1781"/>
-    <p:text>see sys_LastSeenAlive for potential issues with this query</p:text>
-  </p:cm>
-</p:cmLst>
 </file>
 
 <file path=ppt/diagrams/colors1.xml><?xml version="1.0" encoding="utf-8"?>
@@ -1102,12 +1089,6 @@
               <a:solidFill>
                 <a:srgbClr val="C00000"/>
               </a:solidFill>
-              <a:highlight>
-                <a:srgbClr val="FFFF00"/>
-              </a:highlight>
-              <a:latin typeface="+mn-lt"/>
-              <a:ea typeface="Calibri"/>
-              <a:cs typeface="Times New Roman"/>
             </a:rPr>
             <a:t>BroodEggDate</a:t>
           </a:r>
@@ -1115,12 +1096,6 @@
             <a:solidFill>
               <a:srgbClr val="C00000"/>
             </a:solidFill>
-            <a:highlight>
-              <a:srgbClr val="FFFF00"/>
-            </a:highlight>
-            <a:latin typeface="+mn-lt"/>
-            <a:ea typeface="Calibri"/>
-            <a:cs typeface="Times New Roman"/>
           </a:endParaRPr>
         </a:p>
       </dgm:t>
@@ -2051,21 +2026,93 @@
                 <a:srgbClr val="7030A0"/>
               </a:solidFill>
             </a:rPr>
-            <a:t>-give per captures of chick, the category of measurement (‘d3’ d7…) and the </a:t>
+            <a:t>-give per captures of chick, the category of </a:t>
+          </a:r>
+          <a:r>
+            <a:rPr lang="en-US" sz="900" b="0" smtClean="0">
+              <a:solidFill>
+                <a:srgbClr val="7030A0"/>
+              </a:solidFill>
+            </a:rPr>
+            <a:t>measurement </a:t>
+          </a:r>
+          <a:r>
+            <a:rPr lang="en-US" sz="900" b="0" smtClean="0">
+              <a:solidFill>
+                <a:srgbClr val="7030A0"/>
+              </a:solidFill>
+            </a:rPr>
+            <a:t/>
+          </a:r>
+          <a:br>
+            <a:rPr lang="en-US" sz="900" b="0" smtClean="0">
+              <a:solidFill>
+                <a:srgbClr val="7030A0"/>
+              </a:solidFill>
+            </a:rPr>
+          </a:br>
+          <a:r>
+            <a:rPr lang="en-US" sz="900" b="0" smtClean="0">
+              <a:solidFill>
+                <a:srgbClr val="7030A0"/>
+              </a:solidFill>
+            </a:rPr>
+            <a:t>(‘</a:t>
           </a:r>
           <a:r>
             <a:rPr lang="en-US" sz="900" b="0" dirty="0" smtClean="0">
               <a:solidFill>
                 <a:srgbClr val="7030A0"/>
               </a:solidFill>
-              <a:highlight>
-                <a:srgbClr val="FFFF00"/>
-              </a:highlight>
-              <a:latin typeface="+mn-lt"/>
-              <a:ea typeface="Calibri"/>
-              <a:cs typeface="Times New Roman"/>
             </a:rPr>
-            <a:t>age of the chick (this could be wrong!)</a:t>
+            <a:t>d3’ d7…) </a:t>
+          </a:r>
+          <a:r>
+            <a:rPr lang="en-US" sz="900" b="0" smtClean="0">
+              <a:solidFill>
+                <a:srgbClr val="7030A0"/>
+              </a:solidFill>
+            </a:rPr>
+            <a:t>and </a:t>
+          </a:r>
+          <a:r>
+            <a:rPr lang="en-US" sz="900" b="0" smtClean="0">
+              <a:solidFill>
+                <a:srgbClr val="7030A0"/>
+              </a:solidFill>
+            </a:rPr>
+            <a:t/>
+          </a:r>
+          <a:br>
+            <a:rPr lang="en-US" sz="900" b="0" smtClean="0">
+              <a:solidFill>
+                <a:srgbClr val="7030A0"/>
+              </a:solidFill>
+            </a:rPr>
+          </a:br>
+          <a:r>
+            <a:rPr lang="en-US" sz="900" b="0" smtClean="0">
+              <a:solidFill>
+                <a:srgbClr val="7030A0"/>
+              </a:solidFill>
+            </a:rPr>
+            <a:t>the </a:t>
+          </a:r>
+          <a:r>
+            <a:rPr lang="en-US" sz="900" b="0" dirty="0" smtClean="0">
+              <a:solidFill>
+                <a:srgbClr val="7030A0"/>
+              </a:solidFill>
+            </a:rPr>
+            <a:t>age </a:t>
+          </a:r>
+          <a:r>
+            <a:rPr lang="en-US" sz="900" b="0" smtClean="0">
+              <a:solidFill>
+                <a:srgbClr val="7030A0"/>
+              </a:solidFill>
+            </a:rPr>
+            <a:t>of the chick</a:t>
           </a:r>
           <a:endParaRPr lang="en-US" sz="900" b="0" dirty="0">
             <a:solidFill>
@@ -2505,12 +2552,6 @@
                   <a:lumMod val="75000"/>
                 </a:schemeClr>
               </a:solidFill>
-              <a:highlight>
-                <a:srgbClr val="FFFF00"/>
-              </a:highlight>
-              <a:latin typeface="+mn-lt"/>
-              <a:ea typeface="Calibri"/>
-              <a:cs typeface="Times New Roman"/>
             </a:rPr>
             <a:t>BirdEgg</a:t>
           </a:r>
@@ -2552,12 +2593,6 @@
                   <a:lumMod val="75000"/>
                 </a:schemeClr>
               </a:solidFill>
-              <a:highlight>
-                <a:srgbClr val="FFFF00"/>
-              </a:highlight>
-              <a:latin typeface="+mn-lt"/>
-              <a:ea typeface="Calibri"/>
-              <a:cs typeface="Times New Roman"/>
             </a:rPr>
             <a:t>HatchDates</a:t>
           </a:r>
@@ -2567,12 +2602,6 @@
                 <a:lumMod val="75000"/>
               </a:schemeClr>
             </a:solidFill>
-            <a:highlight>
-              <a:srgbClr val="FFFF00"/>
-            </a:highlight>
-            <a:latin typeface="+mn-lt"/>
-            <a:ea typeface="Calibri"/>
-            <a:cs typeface="Times New Roman"/>
           </a:endParaRPr>
         </a:p>
       </dgm:t>
@@ -6703,12 +6732,6 @@
               <a:solidFill>
                 <a:srgbClr val="C00000"/>
               </a:solidFill>
-              <a:highlight>
-                <a:srgbClr val="FFFF00"/>
-              </a:highlight>
-              <a:latin typeface="+mn-lt"/>
-              <a:ea typeface="Calibri"/>
-              <a:cs typeface="Times New Roman"/>
             </a:rPr>
             <a:t>BroodEggDate</a:t>
           </a:r>
@@ -6716,12 +6739,6 @@
             <a:solidFill>
               <a:srgbClr val="C00000"/>
             </a:solidFill>
-            <a:highlight>
-              <a:srgbClr val="FFFF00"/>
-            </a:highlight>
-            <a:latin typeface="+mn-lt"/>
-            <a:ea typeface="Calibri"/>
-            <a:cs typeface="Times New Roman"/>
           </a:endParaRPr>
         </a:p>
       </dsp:txBody>
@@ -7247,21 +7264,93 @@
                 <a:srgbClr val="7030A0"/>
               </a:solidFill>
             </a:rPr>
-            <a:t>-give per captures of chick, the category of measurement (‘d3’ d7…) and the </a:t>
+            <a:t>-give per captures of chick, the category of </a:t>
+          </a:r>
+          <a:r>
+            <a:rPr lang="en-US" sz="900" b="0" kern="1200" smtClean="0">
+              <a:solidFill>
+                <a:srgbClr val="7030A0"/>
+              </a:solidFill>
+            </a:rPr>
+            <a:t>measurement </a:t>
+          </a:r>
+          <a:r>
+            <a:rPr lang="en-US" sz="900" b="0" kern="1200" smtClean="0">
+              <a:solidFill>
+                <a:srgbClr val="7030A0"/>
+              </a:solidFill>
+            </a:rPr>
+            <a:t/>
+          </a:r>
+          <a:br>
+            <a:rPr lang="en-US" sz="900" b="0" kern="1200" smtClean="0">
+              <a:solidFill>
+                <a:srgbClr val="7030A0"/>
+              </a:solidFill>
+            </a:rPr>
+          </a:br>
+          <a:r>
+            <a:rPr lang="en-US" sz="900" b="0" kern="1200" smtClean="0">
+              <a:solidFill>
+                <a:srgbClr val="7030A0"/>
+              </a:solidFill>
+            </a:rPr>
+            <a:t>(‘</a:t>
           </a:r>
           <a:r>
             <a:rPr lang="en-US" sz="900" b="0" kern="1200" dirty="0" smtClean="0">
               <a:solidFill>
                 <a:srgbClr val="7030A0"/>
               </a:solidFill>
-              <a:highlight>
-                <a:srgbClr val="FFFF00"/>
-              </a:highlight>
-              <a:latin typeface="+mn-lt"/>
-              <a:ea typeface="Calibri"/>
-              <a:cs typeface="Times New Roman"/>
             </a:rPr>
-            <a:t>age of the chick (this could be wrong!)</a:t>
+            <a:t>d3’ d7…) </a:t>
+          </a:r>
+          <a:r>
+            <a:rPr lang="en-US" sz="900" b="0" kern="1200" smtClean="0">
+              <a:solidFill>
+                <a:srgbClr val="7030A0"/>
+              </a:solidFill>
+            </a:rPr>
+            <a:t>and </a:t>
+          </a:r>
+          <a:r>
+            <a:rPr lang="en-US" sz="900" b="0" kern="1200" smtClean="0">
+              <a:solidFill>
+                <a:srgbClr val="7030A0"/>
+              </a:solidFill>
+            </a:rPr>
+            <a:t/>
+          </a:r>
+          <a:br>
+            <a:rPr lang="en-US" sz="900" b="0" kern="1200" smtClean="0">
+              <a:solidFill>
+                <a:srgbClr val="7030A0"/>
+              </a:solidFill>
+            </a:rPr>
+          </a:br>
+          <a:r>
+            <a:rPr lang="en-US" sz="900" b="0" kern="1200" smtClean="0">
+              <a:solidFill>
+                <a:srgbClr val="7030A0"/>
+              </a:solidFill>
+            </a:rPr>
+            <a:t>the </a:t>
+          </a:r>
+          <a:r>
+            <a:rPr lang="en-US" sz="900" b="0" kern="1200" dirty="0" smtClean="0">
+              <a:solidFill>
+                <a:srgbClr val="7030A0"/>
+              </a:solidFill>
+            </a:rPr>
+            <a:t>age </a:t>
+          </a:r>
+          <a:r>
+            <a:rPr lang="en-US" sz="900" b="0" kern="1200" smtClean="0">
+              <a:solidFill>
+                <a:srgbClr val="7030A0"/>
+              </a:solidFill>
+            </a:rPr>
+            <a:t>of the chick</a:t>
           </a:r>
           <a:endParaRPr lang="en-US" sz="900" b="0" kern="1200" dirty="0">
             <a:solidFill>
@@ -7430,12 +7519,6 @@
                   <a:lumMod val="75000"/>
                 </a:schemeClr>
               </a:solidFill>
-              <a:highlight>
-                <a:srgbClr val="FFFF00"/>
-              </a:highlight>
-              <a:latin typeface="+mn-lt"/>
-              <a:ea typeface="Calibri"/>
-              <a:cs typeface="Times New Roman"/>
             </a:rPr>
             <a:t>BirdEgg</a:t>
           </a:r>
@@ -7477,12 +7560,6 @@
                   <a:lumMod val="75000"/>
                 </a:schemeClr>
               </a:solidFill>
-              <a:highlight>
-                <a:srgbClr val="FFFF00"/>
-              </a:highlight>
-              <a:latin typeface="+mn-lt"/>
-              <a:ea typeface="Calibri"/>
-              <a:cs typeface="Times New Roman"/>
             </a:rPr>
             <a:t>HatchDates</a:t>
           </a:r>
@@ -7492,12 +7569,6 @@
                 <a:lumMod val="75000"/>
               </a:schemeClr>
             </a:solidFill>
-            <a:highlight>
-              <a:srgbClr val="FFFF00"/>
-            </a:highlight>
-            <a:latin typeface="+mn-lt"/>
-            <a:ea typeface="Calibri"/>
-            <a:cs typeface="Times New Roman"/>
           </a:endParaRPr>
         </a:p>
       </dsp:txBody>
@@ -11239,7 +11310,7 @@
           <a:p>
             <a:fld id="{D3975E03-0759-44A0-8E6A-31434AAC4247}" type="datetimeFigureOut">
               <a:rPr lang="en-US" smtClean="0"/>
-              <a:t>06.12.2015</a:t>
+              <a:t>02.05.2016</a:t>
             </a:fld>
             <a:endParaRPr lang="en-US"/>
           </a:p>
@@ -11409,7 +11480,7 @@
           <a:p>
             <a:fld id="{D3975E03-0759-44A0-8E6A-31434AAC4247}" type="datetimeFigureOut">
               <a:rPr lang="en-US" smtClean="0"/>
-              <a:t>06.12.2015</a:t>
+              <a:t>02.05.2016</a:t>
             </a:fld>
             <a:endParaRPr lang="en-US"/>
           </a:p>
@@ -11589,7 +11660,7 @@
           <a:p>
             <a:fld id="{D3975E03-0759-44A0-8E6A-31434AAC4247}" type="datetimeFigureOut">
               <a:rPr lang="en-US" smtClean="0"/>
-              <a:t>06.12.2015</a:t>
+              <a:t>02.05.2016</a:t>
             </a:fld>
             <a:endParaRPr lang="en-US"/>
           </a:p>
@@ -11759,7 +11830,7 @@
           <a:p>
             <a:fld id="{D3975E03-0759-44A0-8E6A-31434AAC4247}" type="datetimeFigureOut">
               <a:rPr lang="en-US" smtClean="0"/>
-              <a:t>06.12.2015</a:t>
+              <a:t>02.05.2016</a:t>
             </a:fld>
             <a:endParaRPr lang="en-US"/>
           </a:p>
@@ -12005,7 +12076,7 @@
           <a:p>
             <a:fld id="{D3975E03-0759-44A0-8E6A-31434AAC4247}" type="datetimeFigureOut">
               <a:rPr lang="en-US" smtClean="0"/>
-              <a:t>06.12.2015</a:t>
+              <a:t>02.05.2016</a:t>
             </a:fld>
             <a:endParaRPr lang="en-US"/>
           </a:p>
@@ -12293,7 +12364,7 @@
           <a:p>
             <a:fld id="{D3975E03-0759-44A0-8E6A-31434AAC4247}" type="datetimeFigureOut">
               <a:rPr lang="en-US" smtClean="0"/>
-              <a:t>06.12.2015</a:t>
+              <a:t>02.05.2016</a:t>
             </a:fld>
             <a:endParaRPr lang="en-US"/>
           </a:p>
@@ -12720,7 +12791,7 @@
           <a:p>
             <a:fld id="{D3975E03-0759-44A0-8E6A-31434AAC4247}" type="datetimeFigureOut">
               <a:rPr lang="en-US" smtClean="0"/>
-              <a:t>06.12.2015</a:t>
+              <a:t>02.05.2016</a:t>
             </a:fld>
             <a:endParaRPr lang="en-US"/>
           </a:p>
@@ -12838,7 +12909,7 @@
           <a:p>
             <a:fld id="{D3975E03-0759-44A0-8E6A-31434AAC4247}" type="datetimeFigureOut">
               <a:rPr lang="en-US" smtClean="0"/>
-              <a:t>06.12.2015</a:t>
+              <a:t>02.05.2016</a:t>
             </a:fld>
             <a:endParaRPr lang="en-US"/>
           </a:p>
@@ -12933,7 +13004,7 @@
           <a:p>
             <a:fld id="{D3975E03-0759-44A0-8E6A-31434AAC4247}" type="datetimeFigureOut">
               <a:rPr lang="en-US" smtClean="0"/>
-              <a:t>06.12.2015</a:t>
+              <a:t>02.05.2016</a:t>
             </a:fld>
             <a:endParaRPr lang="en-US"/>
           </a:p>
@@ -13210,7 +13281,7 @@
           <a:p>
             <a:fld id="{D3975E03-0759-44A0-8E6A-31434AAC4247}" type="datetimeFigureOut">
               <a:rPr lang="en-US" smtClean="0"/>
-              <a:t>06.12.2015</a:t>
+              <a:t>02.05.2016</a:t>
             </a:fld>
             <a:endParaRPr lang="en-US"/>
           </a:p>
@@ -13463,7 +13534,7 @@
           <a:p>
             <a:fld id="{D3975E03-0759-44A0-8E6A-31434AAC4247}" type="datetimeFigureOut">
               <a:rPr lang="en-US" smtClean="0"/>
-              <a:t>06.12.2015</a:t>
+              <a:t>02.05.2016</a:t>
             </a:fld>
             <a:endParaRPr lang="en-US"/>
           </a:p>
@@ -13676,7 +13747,7 @@
           <a:p>
             <a:fld id="{D3975E03-0759-44A0-8E6A-31434AAC4247}" type="datetimeFigureOut">
               <a:rPr lang="en-US" smtClean="0"/>
-              <a:t>06.12.2015</a:t>
+              <a:t>02.05.2016</a:t>
             </a:fld>
             <a:endParaRPr lang="en-US"/>
           </a:p>
@@ -14058,7 +14129,7 @@
           <p:nvPr>
             <p:extLst>
               <p:ext uri="{D42A27DB-BD31-4B8C-83A1-F6EECF244321}">
-                <p14:modId xmlns:p14="http://schemas.microsoft.com/office/powerpoint/2010/main" val="196159032"/>
+                <p14:modId xmlns:p14="http://schemas.microsoft.com/office/powerpoint/2010/main" val="2204929464"/>
               </p:ext>
             </p:extLst>
           </p:nvPr>

</xml_diff>